<commit_message>
for the synchronous motor journal,  figures are updated and
source files are added
</commit_message>
<xml_diff>
--- a/Synhronous motor/TPEL-Journal-version-2/Restriction/New Microsoft PowerPoint Presentation.pptx
+++ b/Synhronous motor/TPEL-Journal-version-2/Restriction/New Microsoft PowerPoint Presentation.pptx
@@ -9,6 +9,7 @@
     <p:sldId id="258" r:id="rId3"/>
     <p:sldId id="257" r:id="rId4"/>
     <p:sldId id="259" r:id="rId5"/>
+    <p:sldId id="260" r:id="rId6"/>
   </p:sldIdLst>
   <p:sldSz cx="12192000" cy="6858000"/>
   <p:notesSz cx="6858000" cy="9144000"/>
@@ -107,6 +108,11 @@
       </a:defRPr>
     </a:lvl9pPr>
   </p:defaultTextStyle>
+  <p:extLst>
+    <p:ext uri="{EFAFB233-063F-42B5-8137-9DF3F51BA10A}">
+      <p15:sldGuideLst xmlns:p15="http://schemas.microsoft.com/office/powerpoint/2012/main"/>
+    </p:ext>
+  </p:extLst>
 </p:presentation>
 </file>
 
@@ -257,7 +263,7 @@
           <a:p>
             <a:fld id="{9B6C5048-A42E-4B63-8EDC-C75748A1375C}" type="datetimeFigureOut">
               <a:rPr lang="en-US" smtClean="0"/>
-              <a:t>10/31/2022</a:t>
+              <a:t>11/1/2022</a:t>
             </a:fld>
             <a:endParaRPr lang="en-US"/>
           </a:p>
@@ -455,7 +461,7 @@
           <a:p>
             <a:fld id="{9B6C5048-A42E-4B63-8EDC-C75748A1375C}" type="datetimeFigureOut">
               <a:rPr lang="en-US" smtClean="0"/>
-              <a:t>10/31/2022</a:t>
+              <a:t>11/1/2022</a:t>
             </a:fld>
             <a:endParaRPr lang="en-US"/>
           </a:p>
@@ -663,7 +669,7 @@
           <a:p>
             <a:fld id="{9B6C5048-A42E-4B63-8EDC-C75748A1375C}" type="datetimeFigureOut">
               <a:rPr lang="en-US" smtClean="0"/>
-              <a:t>10/31/2022</a:t>
+              <a:t>11/1/2022</a:t>
             </a:fld>
             <a:endParaRPr lang="en-US"/>
           </a:p>
@@ -861,7 +867,7 @@
           <a:p>
             <a:fld id="{9B6C5048-A42E-4B63-8EDC-C75748A1375C}" type="datetimeFigureOut">
               <a:rPr lang="en-US" smtClean="0"/>
-              <a:t>10/31/2022</a:t>
+              <a:t>11/1/2022</a:t>
             </a:fld>
             <a:endParaRPr lang="en-US"/>
           </a:p>
@@ -1136,7 +1142,7 @@
           <a:p>
             <a:fld id="{9B6C5048-A42E-4B63-8EDC-C75748A1375C}" type="datetimeFigureOut">
               <a:rPr lang="en-US" smtClean="0"/>
-              <a:t>10/31/2022</a:t>
+              <a:t>11/1/2022</a:t>
             </a:fld>
             <a:endParaRPr lang="en-US"/>
           </a:p>
@@ -1401,7 +1407,7 @@
           <a:p>
             <a:fld id="{9B6C5048-A42E-4B63-8EDC-C75748A1375C}" type="datetimeFigureOut">
               <a:rPr lang="en-US" smtClean="0"/>
-              <a:t>10/31/2022</a:t>
+              <a:t>11/1/2022</a:t>
             </a:fld>
             <a:endParaRPr lang="en-US"/>
           </a:p>
@@ -1813,7 +1819,7 @@
           <a:p>
             <a:fld id="{9B6C5048-A42E-4B63-8EDC-C75748A1375C}" type="datetimeFigureOut">
               <a:rPr lang="en-US" smtClean="0"/>
-              <a:t>10/31/2022</a:t>
+              <a:t>11/1/2022</a:t>
             </a:fld>
             <a:endParaRPr lang="en-US"/>
           </a:p>
@@ -1954,7 +1960,7 @@
           <a:p>
             <a:fld id="{9B6C5048-A42E-4B63-8EDC-C75748A1375C}" type="datetimeFigureOut">
               <a:rPr lang="en-US" smtClean="0"/>
-              <a:t>10/31/2022</a:t>
+              <a:t>11/1/2022</a:t>
             </a:fld>
             <a:endParaRPr lang="en-US"/>
           </a:p>
@@ -2067,7 +2073,7 @@
           <a:p>
             <a:fld id="{9B6C5048-A42E-4B63-8EDC-C75748A1375C}" type="datetimeFigureOut">
               <a:rPr lang="en-US" smtClean="0"/>
-              <a:t>10/31/2022</a:t>
+              <a:t>11/1/2022</a:t>
             </a:fld>
             <a:endParaRPr lang="en-US"/>
           </a:p>
@@ -2378,7 +2384,7 @@
           <a:p>
             <a:fld id="{9B6C5048-A42E-4B63-8EDC-C75748A1375C}" type="datetimeFigureOut">
               <a:rPr lang="en-US" smtClean="0"/>
-              <a:t>10/31/2022</a:t>
+              <a:t>11/1/2022</a:t>
             </a:fld>
             <a:endParaRPr lang="en-US"/>
           </a:p>
@@ -2666,7 +2672,7 @@
           <a:p>
             <a:fld id="{9B6C5048-A42E-4B63-8EDC-C75748A1375C}" type="datetimeFigureOut">
               <a:rPr lang="en-US" smtClean="0"/>
-              <a:t>10/31/2022</a:t>
+              <a:t>11/1/2022</a:t>
             </a:fld>
             <a:endParaRPr lang="en-US"/>
           </a:p>
@@ -2907,7 +2913,7 @@
           <a:p>
             <a:fld id="{9B6C5048-A42E-4B63-8EDC-C75748A1375C}" type="datetimeFigureOut">
               <a:rPr lang="en-US" smtClean="0"/>
-              <a:t>10/31/2022</a:t>
+              <a:t>11/1/2022</a:t>
             </a:fld>
             <a:endParaRPr lang="en-US"/>
           </a:p>
@@ -3469,8 +3475,8 @@
           </a:prstGeom>
         </p:spPr>
       </p:pic>
-      <mc:AlternateContent xmlns:mc="http://schemas.openxmlformats.org/markup-compatibility/2006">
-        <mc:Choice xmlns:a14="http://schemas.microsoft.com/office/drawing/2010/main" Requires="a14">
+      <mc:AlternateContent xmlns:mc="http://schemas.openxmlformats.org/markup-compatibility/2006" xmlns:a14="http://schemas.microsoft.com/office/drawing/2010/main">
+        <mc:Choice Requires="a14">
           <p:sp>
             <p:nvSpPr>
               <p:cNvPr id="22" name="TextBox 21">
@@ -3499,6 +3505,7 @@
               </a:bodyPr>
               <a:lstStyle/>
               <a:p>
+                <a:pPr/>
                 <a14:m>
                   <m:oMathPara xmlns:m="http://schemas.openxmlformats.org/officeDocument/2006/math">
                     <m:oMathParaPr>
@@ -3522,7 +3529,7 @@
             </p:txBody>
           </p:sp>
         </mc:Choice>
-        <mc:Fallback>
+        <mc:Fallback xmlns="">
           <p:sp>
             <p:nvSpPr>
               <p:cNvPr id="22" name="TextBox 21">
@@ -3739,8 +3746,8 @@
           </a:fontRef>
         </p:style>
       </p:cxnSp>
-      <mc:AlternateContent xmlns:mc="http://schemas.openxmlformats.org/markup-compatibility/2006">
-        <mc:Choice xmlns:a14="http://schemas.microsoft.com/office/drawing/2010/main" Requires="a14">
+      <mc:AlternateContent xmlns:mc="http://schemas.openxmlformats.org/markup-compatibility/2006" xmlns:a14="http://schemas.microsoft.com/office/drawing/2010/main">
+        <mc:Choice Requires="a14">
           <p:sp>
             <p:nvSpPr>
               <p:cNvPr id="31" name="TextBox 30">
@@ -3769,6 +3776,7 @@
               </a:bodyPr>
               <a:lstStyle/>
               <a:p>
+                <a:pPr/>
                 <a14:m>
                   <m:oMathPara xmlns:m="http://schemas.openxmlformats.org/officeDocument/2006/math">
                     <m:oMathParaPr>
@@ -3789,7 +3797,7 @@
             </p:txBody>
           </p:sp>
         </mc:Choice>
-        <mc:Fallback>
+        <mc:Fallback xmlns="">
           <p:sp>
             <p:nvSpPr>
               <p:cNvPr id="31" name="TextBox 30">
@@ -3834,8 +3842,8 @@
           </p:sp>
         </mc:Fallback>
       </mc:AlternateContent>
-      <mc:AlternateContent xmlns:mc="http://schemas.openxmlformats.org/markup-compatibility/2006">
-        <mc:Choice xmlns:a14="http://schemas.microsoft.com/office/drawing/2010/main" Requires="a14">
+      <mc:AlternateContent xmlns:mc="http://schemas.openxmlformats.org/markup-compatibility/2006" xmlns:a14="http://schemas.microsoft.com/office/drawing/2010/main">
+        <mc:Choice Requires="a14">
           <p:sp>
             <p:nvSpPr>
               <p:cNvPr id="32" name="TextBox 31">
@@ -3864,6 +3872,7 @@
               </a:bodyPr>
               <a:lstStyle/>
               <a:p>
+                <a:pPr/>
                 <a14:m>
                   <m:oMathPara xmlns:m="http://schemas.openxmlformats.org/officeDocument/2006/math">
                     <m:oMathParaPr>
@@ -3884,7 +3893,7 @@
             </p:txBody>
           </p:sp>
         </mc:Choice>
-        <mc:Fallback>
+        <mc:Fallback xmlns="">
           <p:sp>
             <p:nvSpPr>
               <p:cNvPr id="32" name="TextBox 31">
@@ -3929,8 +3938,8 @@
           </p:sp>
         </mc:Fallback>
       </mc:AlternateContent>
-      <mc:AlternateContent xmlns:mc="http://schemas.openxmlformats.org/markup-compatibility/2006">
-        <mc:Choice xmlns:a14="http://schemas.microsoft.com/office/drawing/2010/main" Requires="a14">
+      <mc:AlternateContent xmlns:mc="http://schemas.openxmlformats.org/markup-compatibility/2006" xmlns:a14="http://schemas.microsoft.com/office/drawing/2010/main">
+        <mc:Choice Requires="a14">
           <p:sp>
             <p:nvSpPr>
               <p:cNvPr id="33" name="TextBox 32">
@@ -3959,6 +3968,7 @@
               </a:bodyPr>
               <a:lstStyle/>
               <a:p>
+                <a:pPr/>
                 <a14:m>
                   <m:oMathPara xmlns:m="http://schemas.openxmlformats.org/officeDocument/2006/math">
                     <m:oMathParaPr>
@@ -3979,7 +3989,7 @@
             </p:txBody>
           </p:sp>
         </mc:Choice>
-        <mc:Fallback>
+        <mc:Fallback xmlns="">
           <p:sp>
             <p:nvSpPr>
               <p:cNvPr id="33" name="TextBox 32">
@@ -4024,8 +4034,8 @@
           </p:sp>
         </mc:Fallback>
       </mc:AlternateContent>
-      <mc:AlternateContent xmlns:mc="http://schemas.openxmlformats.org/markup-compatibility/2006">
-        <mc:Choice xmlns:a14="http://schemas.microsoft.com/office/drawing/2010/main" Requires="a14">
+      <mc:AlternateContent xmlns:mc="http://schemas.openxmlformats.org/markup-compatibility/2006" xmlns:a14="http://schemas.microsoft.com/office/drawing/2010/main">
+        <mc:Choice Requires="a14">
           <p:sp>
             <p:nvSpPr>
               <p:cNvPr id="34" name="TextBox 33">
@@ -4054,6 +4064,7 @@
               </a:bodyPr>
               <a:lstStyle/>
               <a:p>
+                <a:pPr/>
                 <a14:m>
                   <m:oMathPara xmlns:m="http://schemas.openxmlformats.org/officeDocument/2006/math">
                     <m:oMathParaPr>
@@ -4074,7 +4085,7 @@
             </p:txBody>
           </p:sp>
         </mc:Choice>
-        <mc:Fallback>
+        <mc:Fallback xmlns="">
           <p:sp>
             <p:nvSpPr>
               <p:cNvPr id="34" name="TextBox 33">
@@ -4119,8 +4130,8 @@
           </p:sp>
         </mc:Fallback>
       </mc:AlternateContent>
-      <mc:AlternateContent xmlns:mc="http://schemas.openxmlformats.org/markup-compatibility/2006">
-        <mc:Choice xmlns:a14="http://schemas.microsoft.com/office/drawing/2010/main" Requires="a14">
+      <mc:AlternateContent xmlns:mc="http://schemas.openxmlformats.org/markup-compatibility/2006" xmlns:a14="http://schemas.microsoft.com/office/drawing/2010/main">
+        <mc:Choice Requires="a14">
           <p:sp>
             <p:nvSpPr>
               <p:cNvPr id="35" name="TextBox 34">
@@ -4149,6 +4160,7 @@
               </a:bodyPr>
               <a:lstStyle/>
               <a:p>
+                <a:pPr/>
                 <a14:m>
                   <m:oMathPara xmlns:m="http://schemas.openxmlformats.org/officeDocument/2006/math">
                     <m:oMathParaPr>
@@ -4175,7 +4187,7 @@
             </p:txBody>
           </p:sp>
         </mc:Choice>
-        <mc:Fallback>
+        <mc:Fallback xmlns="">
           <p:sp>
             <p:nvSpPr>
               <p:cNvPr id="35" name="TextBox 34">
@@ -4220,8 +4232,8 @@
           </p:sp>
         </mc:Fallback>
       </mc:AlternateContent>
-      <mc:AlternateContent xmlns:mc="http://schemas.openxmlformats.org/markup-compatibility/2006">
-        <mc:Choice xmlns:a14="http://schemas.microsoft.com/office/drawing/2010/main" Requires="a14">
+      <mc:AlternateContent xmlns:mc="http://schemas.openxmlformats.org/markup-compatibility/2006" xmlns:a14="http://schemas.microsoft.com/office/drawing/2010/main">
+        <mc:Choice Requires="a14">
           <p:sp>
             <p:nvSpPr>
               <p:cNvPr id="36" name="TextBox 35">
@@ -4250,6 +4262,7 @@
               </a:bodyPr>
               <a:lstStyle/>
               <a:p>
+                <a:pPr/>
                 <a14:m>
                   <m:oMathPara xmlns:m="http://schemas.openxmlformats.org/officeDocument/2006/math">
                     <m:oMathParaPr>
@@ -4276,7 +4289,7 @@
             </p:txBody>
           </p:sp>
         </mc:Choice>
-        <mc:Fallback>
+        <mc:Fallback xmlns="">
           <p:sp>
             <p:nvSpPr>
               <p:cNvPr id="36" name="TextBox 35">
@@ -4321,8 +4334,8 @@
           </p:sp>
         </mc:Fallback>
       </mc:AlternateContent>
-      <mc:AlternateContent xmlns:mc="http://schemas.openxmlformats.org/markup-compatibility/2006">
-        <mc:Choice xmlns:a14="http://schemas.microsoft.com/office/drawing/2010/main" Requires="a14">
+      <mc:AlternateContent xmlns:mc="http://schemas.openxmlformats.org/markup-compatibility/2006" xmlns:a14="http://schemas.microsoft.com/office/drawing/2010/main">
+        <mc:Choice Requires="a14">
           <p:sp>
             <p:nvSpPr>
               <p:cNvPr id="37" name="TextBox 36">
@@ -4351,6 +4364,7 @@
               </a:bodyPr>
               <a:lstStyle/>
               <a:p>
+                <a:pPr/>
                 <a14:m>
                   <m:oMathPara xmlns:m="http://schemas.openxmlformats.org/officeDocument/2006/math">
                     <m:oMathParaPr>
@@ -4377,7 +4391,7 @@
             </p:txBody>
           </p:sp>
         </mc:Choice>
-        <mc:Fallback>
+        <mc:Fallback xmlns="">
           <p:sp>
             <p:nvSpPr>
               <p:cNvPr id="37" name="TextBox 36">
@@ -4422,8 +4436,8 @@
           </p:sp>
         </mc:Fallback>
       </mc:AlternateContent>
-      <mc:AlternateContent xmlns:mc="http://schemas.openxmlformats.org/markup-compatibility/2006">
-        <mc:Choice xmlns:a14="http://schemas.microsoft.com/office/drawing/2010/main" Requires="a14">
+      <mc:AlternateContent xmlns:mc="http://schemas.openxmlformats.org/markup-compatibility/2006" xmlns:a14="http://schemas.microsoft.com/office/drawing/2010/main">
+        <mc:Choice Requires="a14">
           <p:sp>
             <p:nvSpPr>
               <p:cNvPr id="38" name="TextBox 37">
@@ -4452,6 +4466,7 @@
               </a:bodyPr>
               <a:lstStyle/>
               <a:p>
+                <a:pPr/>
                 <a14:m>
                   <m:oMathPara xmlns:m="http://schemas.openxmlformats.org/officeDocument/2006/math">
                     <m:oMathParaPr>
@@ -4478,7 +4493,7 @@
             </p:txBody>
           </p:sp>
         </mc:Choice>
-        <mc:Fallback>
+        <mc:Fallback xmlns="">
           <p:sp>
             <p:nvSpPr>
               <p:cNvPr id="38" name="TextBox 37">
@@ -4523,8 +4538,8 @@
           </p:sp>
         </mc:Fallback>
       </mc:AlternateContent>
-      <mc:AlternateContent xmlns:mc="http://schemas.openxmlformats.org/markup-compatibility/2006">
-        <mc:Choice xmlns:a14="http://schemas.microsoft.com/office/drawing/2010/main" Requires="a14">
+      <mc:AlternateContent xmlns:mc="http://schemas.openxmlformats.org/markup-compatibility/2006" xmlns:a14="http://schemas.microsoft.com/office/drawing/2010/main">
+        <mc:Choice Requires="a14">
           <p:sp>
             <p:nvSpPr>
               <p:cNvPr id="39" name="TextBox 38">
@@ -4553,6 +4568,7 @@
               </a:bodyPr>
               <a:lstStyle/>
               <a:p>
+                <a:pPr/>
                 <a14:m>
                   <m:oMathPara xmlns:m="http://schemas.openxmlformats.org/officeDocument/2006/math">
                     <m:oMathParaPr>
@@ -4585,7 +4601,7 @@
             </p:txBody>
           </p:sp>
         </mc:Choice>
-        <mc:Fallback>
+        <mc:Fallback xmlns="">
           <p:sp>
             <p:nvSpPr>
               <p:cNvPr id="39" name="TextBox 38">
@@ -4700,8 +4716,8 @@
           </a:p>
         </p:txBody>
       </p:sp>
-      <mc:AlternateContent xmlns:mc="http://schemas.openxmlformats.org/markup-compatibility/2006">
-        <mc:Choice xmlns:a14="http://schemas.microsoft.com/office/drawing/2010/main" Requires="a14">
+      <mc:AlternateContent xmlns:mc="http://schemas.openxmlformats.org/markup-compatibility/2006" xmlns:a14="http://schemas.microsoft.com/office/drawing/2010/main">
+        <mc:Choice Requires="a14">
           <p:sp>
             <p:nvSpPr>
               <p:cNvPr id="43" name="TextBox 42">
@@ -4821,7 +4837,7 @@
             </p:txBody>
           </p:sp>
         </mc:Choice>
-        <mc:Fallback>
+        <mc:Fallback xmlns="">
           <p:sp>
             <p:nvSpPr>
               <p:cNvPr id="43" name="TextBox 42">
@@ -4866,8 +4882,8 @@
           </p:sp>
         </mc:Fallback>
       </mc:AlternateContent>
-      <mc:AlternateContent xmlns:mc="http://schemas.openxmlformats.org/markup-compatibility/2006">
-        <mc:Choice xmlns:a14="http://schemas.microsoft.com/office/drawing/2010/main" Requires="a14">
+      <mc:AlternateContent xmlns:mc="http://schemas.openxmlformats.org/markup-compatibility/2006" xmlns:a14="http://schemas.microsoft.com/office/drawing/2010/main">
+        <mc:Choice Requires="a14">
           <p:sp>
             <p:nvSpPr>
               <p:cNvPr id="44" name="TextBox 43">
@@ -4896,6 +4912,7 @@
               </a:bodyPr>
               <a:lstStyle/>
               <a:p>
+                <a:pPr/>
                 <a14:m>
                   <m:oMathPara xmlns:m="http://schemas.openxmlformats.org/officeDocument/2006/math">
                     <m:oMathParaPr>
@@ -4948,7 +4965,7 @@
             </p:txBody>
           </p:sp>
         </mc:Choice>
-        <mc:Fallback>
+        <mc:Fallback xmlns="">
           <p:sp>
             <p:nvSpPr>
               <p:cNvPr id="44" name="TextBox 43">
@@ -4993,8 +5010,8 @@
           </p:sp>
         </mc:Fallback>
       </mc:AlternateContent>
-      <mc:AlternateContent xmlns:mc="http://schemas.openxmlformats.org/markup-compatibility/2006">
-        <mc:Choice xmlns:a14="http://schemas.microsoft.com/office/drawing/2010/main" Requires="a14">
+      <mc:AlternateContent xmlns:mc="http://schemas.openxmlformats.org/markup-compatibility/2006" xmlns:a14="http://schemas.microsoft.com/office/drawing/2010/main">
+        <mc:Choice Requires="a14">
           <p:sp>
             <p:nvSpPr>
               <p:cNvPr id="45" name="TextBox 44">
@@ -5023,6 +5040,7 @@
               </a:bodyPr>
               <a:lstStyle/>
               <a:p>
+                <a:pPr/>
                 <a14:m>
                   <m:oMathPara xmlns:m="http://schemas.openxmlformats.org/officeDocument/2006/math">
                     <m:oMathParaPr>
@@ -5075,7 +5093,7 @@
             </p:txBody>
           </p:sp>
         </mc:Choice>
-        <mc:Fallback>
+        <mc:Fallback xmlns="">
           <p:sp>
             <p:nvSpPr>
               <p:cNvPr id="45" name="TextBox 44">
@@ -5120,8 +5138,8 @@
           </p:sp>
         </mc:Fallback>
       </mc:AlternateContent>
-      <mc:AlternateContent xmlns:mc="http://schemas.openxmlformats.org/markup-compatibility/2006">
-        <mc:Choice xmlns:a14="http://schemas.microsoft.com/office/drawing/2010/main" Requires="a14">
+      <mc:AlternateContent xmlns:mc="http://schemas.openxmlformats.org/markup-compatibility/2006" xmlns:a14="http://schemas.microsoft.com/office/drawing/2010/main">
+        <mc:Choice Requires="a14">
           <p:sp>
             <p:nvSpPr>
               <p:cNvPr id="46" name="TextBox 45">
@@ -5150,6 +5168,7 @@
               </a:bodyPr>
               <a:lstStyle/>
               <a:p>
+                <a:pPr/>
                 <a14:m>
                   <m:oMathPara xmlns:m="http://schemas.openxmlformats.org/officeDocument/2006/math">
                     <m:oMathParaPr>
@@ -5202,7 +5221,7 @@
             </p:txBody>
           </p:sp>
         </mc:Choice>
-        <mc:Fallback>
+        <mc:Fallback xmlns="">
           <p:sp>
             <p:nvSpPr>
               <p:cNvPr id="46" name="TextBox 45">
@@ -5247,8 +5266,8 @@
           </p:sp>
         </mc:Fallback>
       </mc:AlternateContent>
-      <mc:AlternateContent xmlns:mc="http://schemas.openxmlformats.org/markup-compatibility/2006">
-        <mc:Choice xmlns:a14="http://schemas.microsoft.com/office/drawing/2010/main" Requires="a14">
+      <mc:AlternateContent xmlns:mc="http://schemas.openxmlformats.org/markup-compatibility/2006" xmlns:a14="http://schemas.microsoft.com/office/drawing/2010/main">
+        <mc:Choice Requires="a14">
           <p:sp>
             <p:nvSpPr>
               <p:cNvPr id="47" name="TextBox 46">
@@ -5277,6 +5296,7 @@
               </a:bodyPr>
               <a:lstStyle/>
               <a:p>
+                <a:pPr/>
                 <a14:m>
                   <m:oMathPara xmlns:m="http://schemas.openxmlformats.org/officeDocument/2006/math">
                     <m:oMathParaPr>
@@ -5329,7 +5349,7 @@
             </p:txBody>
           </p:sp>
         </mc:Choice>
-        <mc:Fallback>
+        <mc:Fallback xmlns="">
           <p:sp>
             <p:nvSpPr>
               <p:cNvPr id="47" name="TextBox 46">
@@ -5374,8 +5394,8 @@
           </p:sp>
         </mc:Fallback>
       </mc:AlternateContent>
-      <mc:AlternateContent xmlns:mc="http://schemas.openxmlformats.org/markup-compatibility/2006">
-        <mc:Choice xmlns:a14="http://schemas.microsoft.com/office/drawing/2010/main" Requires="a14">
+      <mc:AlternateContent xmlns:mc="http://schemas.openxmlformats.org/markup-compatibility/2006" xmlns:a14="http://schemas.microsoft.com/office/drawing/2010/main">
+        <mc:Choice Requires="a14">
           <p:sp>
             <p:nvSpPr>
               <p:cNvPr id="48" name="TextBox 47">
@@ -5406,6 +5426,7 @@
               </a:bodyPr>
               <a:lstStyle/>
               <a:p>
+                <a:pPr/>
                 <a14:m>
                   <m:oMathPara xmlns:m="http://schemas.openxmlformats.org/officeDocument/2006/math">
                     <m:oMathParaPr>
@@ -5458,7 +5479,7 @@
             </p:txBody>
           </p:sp>
         </mc:Choice>
-        <mc:Fallback>
+        <mc:Fallback xmlns="">
           <p:sp>
             <p:nvSpPr>
               <p:cNvPr id="48" name="TextBox 47">
@@ -6253,8 +6274,8 @@
           </a:prstGeom>
         </p:spPr>
       </p:pic>
-      <mc:AlternateContent xmlns:mc="http://schemas.openxmlformats.org/markup-compatibility/2006">
-        <mc:Choice xmlns:a14="http://schemas.microsoft.com/office/drawing/2010/main" Requires="a14">
+      <mc:AlternateContent xmlns:mc="http://schemas.openxmlformats.org/markup-compatibility/2006" xmlns:a14="http://schemas.microsoft.com/office/drawing/2010/main">
+        <mc:Choice Requires="a14">
           <p:sp>
             <p:nvSpPr>
               <p:cNvPr id="9" name="TextBox 8">
@@ -6283,6 +6304,7 @@
               </a:bodyPr>
               <a:lstStyle/>
               <a:p>
+                <a:pPr/>
                 <a14:m>
                   <m:oMathPara xmlns:m="http://schemas.openxmlformats.org/officeDocument/2006/math">
                     <m:oMathParaPr>
@@ -6307,7 +6329,7 @@
             </p:txBody>
           </p:sp>
         </mc:Choice>
-        <mc:Fallback>
+        <mc:Fallback xmlns="">
           <p:sp>
             <p:nvSpPr>
               <p:cNvPr id="9" name="TextBox 8">
@@ -6352,8 +6374,8 @@
           </p:sp>
         </mc:Fallback>
       </mc:AlternateContent>
-      <mc:AlternateContent xmlns:mc="http://schemas.openxmlformats.org/markup-compatibility/2006">
-        <mc:Choice xmlns:a14="http://schemas.microsoft.com/office/drawing/2010/main" Requires="a14">
+      <mc:AlternateContent xmlns:mc="http://schemas.openxmlformats.org/markup-compatibility/2006" xmlns:a14="http://schemas.microsoft.com/office/drawing/2010/main">
+        <mc:Choice Requires="a14">
           <p:sp>
             <p:nvSpPr>
               <p:cNvPr id="15" name="TextBox 14">
@@ -6480,7 +6502,7 @@
             </p:txBody>
           </p:sp>
         </mc:Choice>
-        <mc:Fallback>
+        <mc:Fallback xmlns="">
           <p:sp>
             <p:nvSpPr>
               <p:cNvPr id="15" name="TextBox 14">
@@ -6912,8 +6934,8 @@
           </a:fontRef>
         </p:style>
       </p:cxnSp>
-      <mc:AlternateContent xmlns:mc="http://schemas.openxmlformats.org/markup-compatibility/2006">
-        <mc:Choice xmlns:a14="http://schemas.microsoft.com/office/drawing/2010/main" Requires="a14">
+      <mc:AlternateContent xmlns:mc="http://schemas.openxmlformats.org/markup-compatibility/2006" xmlns:a14="http://schemas.microsoft.com/office/drawing/2010/main">
+        <mc:Choice Requires="a14">
           <p:sp>
             <p:nvSpPr>
               <p:cNvPr id="41" name="TextBox 40">
@@ -6999,7 +7021,7 @@
             </p:txBody>
           </p:sp>
         </mc:Choice>
-        <mc:Fallback>
+        <mc:Fallback xmlns="">
           <p:sp>
             <p:nvSpPr>
               <p:cNvPr id="41" name="TextBox 40">
@@ -7212,8 +7234,8 @@
           </a:fontRef>
         </p:style>
       </p:cxnSp>
-      <mc:AlternateContent xmlns:mc="http://schemas.openxmlformats.org/markup-compatibility/2006">
-        <mc:Choice xmlns:a14="http://schemas.microsoft.com/office/drawing/2010/main" Requires="a14">
+      <mc:AlternateContent xmlns:mc="http://schemas.openxmlformats.org/markup-compatibility/2006" xmlns:a14="http://schemas.microsoft.com/office/drawing/2010/main">
+        <mc:Choice Requires="a14">
           <p:sp>
             <p:nvSpPr>
               <p:cNvPr id="69" name="TextBox 68">
@@ -7242,6 +7264,7 @@
               </a:bodyPr>
               <a:lstStyle/>
               <a:p>
+                <a:pPr/>
                 <a14:m>
                   <m:oMathPara xmlns:m="http://schemas.openxmlformats.org/officeDocument/2006/math">
                     <m:oMathParaPr>
@@ -7266,7 +7289,7 @@
             </p:txBody>
           </p:sp>
         </mc:Choice>
-        <mc:Fallback>
+        <mc:Fallback xmlns="">
           <p:sp>
             <p:nvSpPr>
               <p:cNvPr id="69" name="TextBox 68">
@@ -7315,6 +7338,1126 @@
     <p:extLst>
       <p:ext uri="{BB962C8B-B14F-4D97-AF65-F5344CB8AC3E}">
         <p14:creationId xmlns:p14="http://schemas.microsoft.com/office/powerpoint/2010/main" val="3231006985"/>
+      </p:ext>
+    </p:extLst>
+  </p:cSld>
+  <p:clrMapOvr>
+    <a:masterClrMapping/>
+  </p:clrMapOvr>
+</p:sld>
+</file>
+
+<file path=ppt/slides/slide5.xml><?xml version="1.0" encoding="utf-8"?>
+<p:sld xmlns:a="http://schemas.openxmlformats.org/drawingml/2006/main" xmlns:r="http://schemas.openxmlformats.org/officeDocument/2006/relationships" xmlns:p="http://schemas.openxmlformats.org/presentationml/2006/main">
+  <p:cSld>
+    <p:spTree>
+      <p:nvGrpSpPr>
+        <p:cNvPr id="1" name=""/>
+        <p:cNvGrpSpPr/>
+        <p:nvPr/>
+      </p:nvGrpSpPr>
+      <p:grpSpPr>
+        <a:xfrm>
+          <a:off x="0" y="0"/>
+          <a:ext cx="0" cy="0"/>
+          <a:chOff x="0" y="0"/>
+          <a:chExt cx="0" cy="0"/>
+        </a:xfrm>
+      </p:grpSpPr>
+      <p:pic>
+        <p:nvPicPr>
+          <p:cNvPr id="4" name="Picture 3">
+            <a:extLst>
+              <a:ext uri="{FF2B5EF4-FFF2-40B4-BE49-F238E27FC236}">
+                <a16:creationId xmlns:a16="http://schemas.microsoft.com/office/drawing/2014/main" id="{7E7FDBA7-E88F-4D23-9007-1F89D94A184C}"/>
+              </a:ext>
+            </a:extLst>
+          </p:cNvPr>
+          <p:cNvPicPr>
+            <a:picLocks noChangeAspect="1"/>
+          </p:cNvPicPr>
+          <p:nvPr/>
+        </p:nvPicPr>
+        <p:blipFill>
+          <a:blip r:embed="rId2"/>
+          <a:stretch>
+            <a:fillRect/>
+          </a:stretch>
+        </p:blipFill>
+        <p:spPr>
+          <a:xfrm>
+            <a:off x="2322911" y="1447071"/>
+            <a:ext cx="5715000" cy="2857500"/>
+          </a:xfrm>
+          <a:prstGeom prst="rect">
+            <a:avLst/>
+          </a:prstGeom>
+        </p:spPr>
+      </p:pic>
+      <mc:AlternateContent xmlns:mc="http://schemas.openxmlformats.org/markup-compatibility/2006" xmlns:a14="http://schemas.microsoft.com/office/drawing/2010/main">
+        <mc:Choice Requires="a14">
+          <p:sp>
+            <p:nvSpPr>
+              <p:cNvPr id="9" name="TextBox 8">
+                <a:extLst>
+                  <a:ext uri="{FF2B5EF4-FFF2-40B4-BE49-F238E27FC236}">
+                    <a16:creationId xmlns:a16="http://schemas.microsoft.com/office/drawing/2014/main" id="{71748E58-E168-4C8D-9D7C-B501FEF27564}"/>
+                  </a:ext>
+                </a:extLst>
+              </p:cNvPr>
+              <p:cNvSpPr txBox="1"/>
+              <p:nvPr/>
+            </p:nvSpPr>
+            <p:spPr>
+              <a:xfrm>
+                <a:off x="7011590" y="4299547"/>
+                <a:ext cx="589360" cy="307777"/>
+              </a:xfrm>
+              <a:prstGeom prst="rect">
+                <a:avLst/>
+              </a:prstGeom>
+              <a:noFill/>
+            </p:spPr>
+            <p:txBody>
+              <a:bodyPr wrap="square" rtlCol="0">
+                <a:spAutoFit/>
+              </a:bodyPr>
+              <a:lstStyle/>
+              <a:p>
+                <a:pPr/>
+                <a14:m>
+                  <m:oMathPara xmlns:m="http://schemas.openxmlformats.org/officeDocument/2006/math">
+                    <m:oMathParaPr>
+                      <m:jc m:val="centerGroup"/>
+                    </m:oMathParaPr>
+                    <m:oMath xmlns:m="http://schemas.openxmlformats.org/officeDocument/2006/math">
+                      <m:r>
+                        <a:rPr lang="en-US" sz="1400" b="0" i="1" dirty="0" smtClean="0">
+                          <a:latin typeface="Cambria Math" panose="02040503050406030204" pitchFamily="18" charset="0"/>
+                          <a:cs typeface="Times New Roman" panose="02020603050405020304" pitchFamily="18" charset="0"/>
+                        </a:rPr>
+                        <m:t>0.88</m:t>
+                      </m:r>
+                    </m:oMath>
+                  </m:oMathPara>
+                </a14:m>
+                <a:endParaRPr lang="en-US" sz="1600" dirty="0">
+                  <a:latin typeface="Times New Roman" panose="02020603050405020304" pitchFamily="18" charset="0"/>
+                  <a:cs typeface="Times New Roman" panose="02020603050405020304" pitchFamily="18" charset="0"/>
+                </a:endParaRPr>
+              </a:p>
+            </p:txBody>
+          </p:sp>
+        </mc:Choice>
+        <mc:Fallback xmlns="">
+          <p:sp>
+            <p:nvSpPr>
+              <p:cNvPr id="9" name="TextBox 8">
+                <a:extLst>
+                  <a:ext uri="{FF2B5EF4-FFF2-40B4-BE49-F238E27FC236}">
+                    <a16:creationId xmlns:a16="http://schemas.microsoft.com/office/drawing/2014/main" id="{71748E58-E168-4C8D-9D7C-B501FEF27564}"/>
+                  </a:ext>
+                </a:extLst>
+              </p:cNvPr>
+              <p:cNvSpPr txBox="1">
+                <a:spLocks noRot="1" noChangeAspect="1" noMove="1" noResize="1" noEditPoints="1" noAdjustHandles="1" noChangeArrowheads="1" noChangeShapeType="1" noTextEdit="1"/>
+              </p:cNvSpPr>
+              <p:nvPr/>
+            </p:nvSpPr>
+            <p:spPr>
+              <a:xfrm>
+                <a:off x="7011590" y="4299547"/>
+                <a:ext cx="589360" cy="307777"/>
+              </a:xfrm>
+              <a:prstGeom prst="rect">
+                <a:avLst/>
+              </a:prstGeom>
+              <a:blipFill>
+                <a:blip r:embed="rId3"/>
+                <a:stretch>
+                  <a:fillRect/>
+                </a:stretch>
+              </a:blipFill>
+            </p:spPr>
+            <p:txBody>
+              <a:bodyPr/>
+              <a:lstStyle/>
+              <a:p>
+                <a:r>
+                  <a:rPr lang="en-US">
+                    <a:noFill/>
+                  </a:rPr>
+                  <a:t> </a:t>
+                </a:r>
+              </a:p>
+            </p:txBody>
+          </p:sp>
+        </mc:Fallback>
+      </mc:AlternateContent>
+      <mc:AlternateContent xmlns:mc="http://schemas.openxmlformats.org/markup-compatibility/2006" xmlns:a14="http://schemas.microsoft.com/office/drawing/2010/main">
+        <mc:Choice Requires="a14">
+          <p:sp>
+            <p:nvSpPr>
+              <p:cNvPr id="15" name="TextBox 14">
+                <a:extLst>
+                  <a:ext uri="{FF2B5EF4-FFF2-40B4-BE49-F238E27FC236}">
+                    <a16:creationId xmlns:a16="http://schemas.microsoft.com/office/drawing/2014/main" id="{9AD89EFB-BA84-42B7-9EF6-4FC2E72CB84D}"/>
+                  </a:ext>
+                </a:extLst>
+              </p:cNvPr>
+              <p:cNvSpPr txBox="1"/>
+              <p:nvPr/>
+            </p:nvSpPr>
+            <p:spPr>
+              <a:xfrm rot="16200000">
+                <a:off x="1847357" y="2568914"/>
+                <a:ext cx="1355514" cy="443455"/>
+              </a:xfrm>
+              <a:prstGeom prst="rect">
+                <a:avLst/>
+              </a:prstGeom>
+              <a:noFill/>
+            </p:spPr>
+            <p:txBody>
+              <a:bodyPr wrap="square" rtlCol="0">
+                <a:spAutoFit/>
+              </a:bodyPr>
+              <a:lstStyle/>
+              <a:p>
+                <a14:m>
+                  <m:oMath xmlns:m="http://schemas.openxmlformats.org/officeDocument/2006/math">
+                    <m:sSub>
+                      <m:sSubPr>
+                        <m:ctrlPr>
+                          <a:rPr lang="en-US" b="0" i="1" dirty="0" smtClean="0">
+                            <a:latin typeface="Cambria Math" panose="02040503050406030204" pitchFamily="18" charset="0"/>
+                            <a:cs typeface="Times New Roman" panose="02020603050405020304" pitchFamily="18" charset="0"/>
+                          </a:rPr>
+                        </m:ctrlPr>
+                      </m:sSubPr>
+                      <m:e>
+                        <m:sSub>
+                          <m:sSubPr>
+                            <m:ctrlPr>
+                              <a:rPr lang="en-US" b="0" i="1" dirty="0" smtClean="0">
+                                <a:latin typeface="Cambria Math" panose="02040503050406030204" pitchFamily="18" charset="0"/>
+                                <a:cs typeface="Times New Roman" panose="02020603050405020304" pitchFamily="18" charset="0"/>
+                              </a:rPr>
+                            </m:ctrlPr>
+                          </m:sSubPr>
+                          <m:e>
+                            <m:acc>
+                              <m:accPr>
+                                <m:chr m:val="̂"/>
+                                <m:ctrlPr>
+                                  <a:rPr lang="en-US" b="0" i="1" dirty="0" smtClean="0">
+                                    <a:latin typeface="Cambria Math" panose="02040503050406030204" pitchFamily="18" charset="0"/>
+                                    <a:cs typeface="Times New Roman" panose="02020603050405020304" pitchFamily="18" charset="0"/>
+                                  </a:rPr>
+                                </m:ctrlPr>
+                              </m:accPr>
+                              <m:e>
+                                <m:r>
+                                  <a:rPr lang="en-US" b="0" i="1" dirty="0" smtClean="0">
+                                    <a:latin typeface="Cambria Math" panose="02040503050406030204" pitchFamily="18" charset="0"/>
+                                    <a:cs typeface="Times New Roman" panose="02020603050405020304" pitchFamily="18" charset="0"/>
+                                  </a:rPr>
+                                  <m:t>𝑆</m:t>
+                                </m:r>
+                              </m:e>
+                            </m:acc>
+                          </m:e>
+                          <m:sub>
+                            <m:r>
+                              <a:rPr lang="en-US" b="0" i="1" dirty="0" smtClean="0">
+                                <a:latin typeface="Cambria Math" panose="02040503050406030204" pitchFamily="18" charset="0"/>
+                                <a:cs typeface="Times New Roman" panose="02020603050405020304" pitchFamily="18" charset="0"/>
+                              </a:rPr>
+                              <m:t>𝐴𝐵</m:t>
+                            </m:r>
+                          </m:sub>
+                        </m:sSub>
+                      </m:e>
+                      <m:sub>
+                        <m:r>
+                          <a:rPr lang="en-US" b="0" i="1" dirty="0" smtClean="0">
+                            <a:latin typeface="Cambria Math" panose="02040503050406030204" pitchFamily="18" charset="0"/>
+                            <a:cs typeface="Times New Roman" panose="02020603050405020304" pitchFamily="18" charset="0"/>
+                          </a:rPr>
+                          <m:t>𝑓𝑠</m:t>
+                        </m:r>
+                      </m:sub>
+                    </m:sSub>
+                  </m:oMath>
+                </a14:m>
+                <a:r>
+                  <a:rPr lang="en-US" dirty="0">
+                    <a:latin typeface="Times New Roman" panose="02020603050405020304" pitchFamily="18" charset="0"/>
+                    <a:cs typeface="Times New Roman" panose="02020603050405020304" pitchFamily="18" charset="0"/>
+                  </a:rPr>
+                  <a:t> </a:t>
+                </a:r>
+                <a:r>
+                  <a:rPr lang="en-US" sz="1600" dirty="0">
+                    <a:latin typeface="Times New Roman" panose="02020603050405020304" pitchFamily="18" charset="0"/>
+                    <a:cs typeface="Times New Roman" panose="02020603050405020304" pitchFamily="18" charset="0"/>
+                  </a:rPr>
+                  <a:t>(</a:t>
+                </a:r>
+                <a:r>
+                  <a:rPr lang="en-US" sz="1600" dirty="0" err="1">
+                    <a:latin typeface="Times New Roman" panose="02020603050405020304" pitchFamily="18" charset="0"/>
+                    <a:cs typeface="Times New Roman" panose="02020603050405020304" pitchFamily="18" charset="0"/>
+                  </a:rPr>
+                  <a:t>p.u</a:t>
+                </a:r>
+                <a:r>
+                  <a:rPr lang="en-US" sz="1600" dirty="0">
+                    <a:latin typeface="Times New Roman" panose="02020603050405020304" pitchFamily="18" charset="0"/>
+                    <a:cs typeface="Times New Roman" panose="02020603050405020304" pitchFamily="18" charset="0"/>
+                  </a:rPr>
+                  <a:t>)</a:t>
+                </a:r>
+              </a:p>
+            </p:txBody>
+          </p:sp>
+        </mc:Choice>
+        <mc:Fallback xmlns="">
+          <p:sp>
+            <p:nvSpPr>
+              <p:cNvPr id="15" name="TextBox 14">
+                <a:extLst>
+                  <a:ext uri="{FF2B5EF4-FFF2-40B4-BE49-F238E27FC236}">
+                    <a16:creationId xmlns:a16="http://schemas.microsoft.com/office/drawing/2014/main" id="{9AD89EFB-BA84-42B7-9EF6-4FC2E72CB84D}"/>
+                  </a:ext>
+                </a:extLst>
+              </p:cNvPr>
+              <p:cNvSpPr txBox="1">
+                <a:spLocks noRot="1" noChangeAspect="1" noMove="1" noResize="1" noEditPoints="1" noAdjustHandles="1" noChangeArrowheads="1" noChangeShapeType="1" noTextEdit="1"/>
+              </p:cNvSpPr>
+              <p:nvPr/>
+            </p:nvSpPr>
+            <p:spPr>
+              <a:xfrm rot="16200000">
+                <a:off x="1847357" y="2568914"/>
+                <a:ext cx="1355514" cy="443455"/>
+              </a:xfrm>
+              <a:prstGeom prst="rect">
+                <a:avLst/>
+              </a:prstGeom>
+              <a:blipFill>
+                <a:blip r:embed="rId4"/>
+                <a:stretch>
+                  <a:fillRect l="-5479" r="-6849"/>
+                </a:stretch>
+              </a:blipFill>
+            </p:spPr>
+            <p:txBody>
+              <a:bodyPr/>
+              <a:lstStyle/>
+              <a:p>
+                <a:r>
+                  <a:rPr lang="en-US">
+                    <a:noFill/>
+                  </a:rPr>
+                  <a:t> </a:t>
+                </a:r>
+              </a:p>
+            </p:txBody>
+          </p:sp>
+        </mc:Fallback>
+      </mc:AlternateContent>
+      <p:cxnSp>
+        <p:nvCxnSpPr>
+          <p:cNvPr id="5" name="Straight Arrow Connector 4">
+            <a:extLst>
+              <a:ext uri="{FF2B5EF4-FFF2-40B4-BE49-F238E27FC236}">
+                <a16:creationId xmlns:a16="http://schemas.microsoft.com/office/drawing/2014/main" id="{302B0936-887C-451B-9624-E21106F074DA}"/>
+              </a:ext>
+            </a:extLst>
+          </p:cNvPr>
+          <p:cNvCxnSpPr>
+            <a:cxnSpLocks/>
+          </p:cNvCxnSpPr>
+          <p:nvPr/>
+        </p:nvCxnSpPr>
+        <p:spPr>
+          <a:xfrm flipH="1">
+            <a:off x="5056774" y="2112885"/>
+            <a:ext cx="598301" cy="0"/>
+          </a:xfrm>
+          <a:prstGeom prst="straightConnector1">
+            <a:avLst/>
+          </a:prstGeom>
+          <a:ln w="28575">
+            <a:solidFill>
+              <a:srgbClr val="11F758"/>
+            </a:solidFill>
+            <a:tailEnd type="triangle"/>
+          </a:ln>
+          <a:effectLst>
+            <a:glow rad="25400">
+              <a:schemeClr val="bg1"/>
+            </a:glow>
+          </a:effectLst>
+        </p:spPr>
+        <p:style>
+          <a:lnRef idx="1">
+            <a:schemeClr val="accent1"/>
+          </a:lnRef>
+          <a:fillRef idx="0">
+            <a:schemeClr val="accent1"/>
+          </a:fillRef>
+          <a:effectRef idx="0">
+            <a:schemeClr val="accent1"/>
+          </a:effectRef>
+          <a:fontRef idx="minor">
+            <a:schemeClr val="tx1"/>
+          </a:fontRef>
+        </p:style>
+      </p:cxnSp>
+      <p:sp>
+        <p:nvSpPr>
+          <p:cNvPr id="17" name="TextBox 16">
+            <a:extLst>
+              <a:ext uri="{FF2B5EF4-FFF2-40B4-BE49-F238E27FC236}">
+                <a16:creationId xmlns:a16="http://schemas.microsoft.com/office/drawing/2014/main" id="{808FF71E-CAB8-4408-950C-8F972B9AAAA5}"/>
+              </a:ext>
+            </a:extLst>
+          </p:cNvPr>
+          <p:cNvSpPr txBox="1"/>
+          <p:nvPr/>
+        </p:nvSpPr>
+        <p:spPr>
+          <a:xfrm>
+            <a:off x="5655075" y="1951302"/>
+            <a:ext cx="881848" cy="276999"/>
+          </a:xfrm>
+          <a:prstGeom prst="rect">
+            <a:avLst/>
+          </a:prstGeom>
+          <a:solidFill>
+            <a:schemeClr val="bg1">
+              <a:alpha val="90000"/>
+            </a:schemeClr>
+          </a:solidFill>
+        </p:spPr>
+        <p:txBody>
+          <a:bodyPr wrap="square" rtlCol="0">
+            <a:spAutoFit/>
+          </a:bodyPr>
+          <a:lstStyle/>
+          <a:p>
+            <a:r>
+              <a:rPr lang="en-US" sz="1200" dirty="0">
+                <a:latin typeface="Times New Roman" panose="02020603050405020304" pitchFamily="18" charset="0"/>
+                <a:cs typeface="Times New Roman" panose="02020603050405020304" pitchFamily="18" charset="0"/>
+              </a:rPr>
+              <a:t>Maximum</a:t>
+            </a:r>
+          </a:p>
+        </p:txBody>
+      </p:sp>
+      <p:cxnSp>
+        <p:nvCxnSpPr>
+          <p:cNvPr id="18" name="Straight Arrow Connector 17">
+            <a:extLst>
+              <a:ext uri="{FF2B5EF4-FFF2-40B4-BE49-F238E27FC236}">
+                <a16:creationId xmlns:a16="http://schemas.microsoft.com/office/drawing/2014/main" id="{5236C20A-7DB2-4104-AD7E-9F7C021A0928}"/>
+              </a:ext>
+            </a:extLst>
+          </p:cNvPr>
+          <p:cNvCxnSpPr>
+            <a:cxnSpLocks/>
+          </p:cNvCxnSpPr>
+          <p:nvPr/>
+        </p:nvCxnSpPr>
+        <p:spPr>
+          <a:xfrm flipH="1" flipV="1">
+            <a:off x="5060629" y="3758650"/>
+            <a:ext cx="664616" cy="1"/>
+          </a:xfrm>
+          <a:prstGeom prst="straightConnector1">
+            <a:avLst/>
+          </a:prstGeom>
+          <a:ln w="28575">
+            <a:solidFill>
+              <a:srgbClr val="152FF3"/>
+            </a:solidFill>
+            <a:tailEnd type="triangle"/>
+          </a:ln>
+          <a:effectLst>
+            <a:glow rad="25400">
+              <a:schemeClr val="bg1"/>
+            </a:glow>
+          </a:effectLst>
+        </p:spPr>
+        <p:style>
+          <a:lnRef idx="1">
+            <a:schemeClr val="accent1"/>
+          </a:lnRef>
+          <a:fillRef idx="0">
+            <a:schemeClr val="accent1"/>
+          </a:fillRef>
+          <a:effectRef idx="0">
+            <a:schemeClr val="accent1"/>
+          </a:effectRef>
+          <a:fontRef idx="minor">
+            <a:schemeClr val="tx1"/>
+          </a:fontRef>
+        </p:style>
+      </p:cxnSp>
+      <p:sp>
+        <p:nvSpPr>
+          <p:cNvPr id="19" name="TextBox 18">
+            <a:extLst>
+              <a:ext uri="{FF2B5EF4-FFF2-40B4-BE49-F238E27FC236}">
+                <a16:creationId xmlns:a16="http://schemas.microsoft.com/office/drawing/2014/main" id="{A75A3CC0-083D-466B-99EC-A3738E70DE08}"/>
+              </a:ext>
+            </a:extLst>
+          </p:cNvPr>
+          <p:cNvSpPr txBox="1"/>
+          <p:nvPr/>
+        </p:nvSpPr>
+        <p:spPr>
+          <a:xfrm>
+            <a:off x="5725245" y="3587879"/>
+            <a:ext cx="811677" cy="276999"/>
+          </a:xfrm>
+          <a:prstGeom prst="rect">
+            <a:avLst/>
+          </a:prstGeom>
+          <a:solidFill>
+            <a:schemeClr val="bg1">
+              <a:alpha val="90000"/>
+            </a:schemeClr>
+          </a:solidFill>
+        </p:spPr>
+        <p:txBody>
+          <a:bodyPr wrap="square" rtlCol="0">
+            <a:spAutoFit/>
+          </a:bodyPr>
+          <a:lstStyle/>
+          <a:p>
+            <a:r>
+              <a:rPr lang="en-US" sz="1200" dirty="0">
+                <a:latin typeface="Times New Roman" panose="02020603050405020304" pitchFamily="18" charset="0"/>
+                <a:cs typeface="Times New Roman" panose="02020603050405020304" pitchFamily="18" charset="0"/>
+              </a:rPr>
+              <a:t>Minimum</a:t>
+            </a:r>
+          </a:p>
+        </p:txBody>
+      </p:sp>
+      <p:sp>
+        <p:nvSpPr>
+          <p:cNvPr id="20" name="TextBox 19">
+            <a:extLst>
+              <a:ext uri="{FF2B5EF4-FFF2-40B4-BE49-F238E27FC236}">
+                <a16:creationId xmlns:a16="http://schemas.microsoft.com/office/drawing/2014/main" id="{B1A4F61C-DBF2-4F2C-9352-65CB759B0C56}"/>
+              </a:ext>
+            </a:extLst>
+          </p:cNvPr>
+          <p:cNvSpPr txBox="1"/>
+          <p:nvPr/>
+        </p:nvSpPr>
+        <p:spPr>
+          <a:xfrm>
+            <a:off x="4775199" y="2565704"/>
+            <a:ext cx="1136941" cy="461665"/>
+          </a:xfrm>
+          <a:prstGeom prst="rect">
+            <a:avLst/>
+          </a:prstGeom>
+          <a:solidFill>
+            <a:schemeClr val="bg1">
+              <a:alpha val="95000"/>
+            </a:schemeClr>
+          </a:solidFill>
+        </p:spPr>
+        <p:txBody>
+          <a:bodyPr wrap="square" rtlCol="0">
+            <a:spAutoFit/>
+          </a:bodyPr>
+          <a:lstStyle/>
+          <a:p>
+            <a:pPr algn="ctr"/>
+            <a:r>
+              <a:rPr lang="en-US" sz="1200" dirty="0">
+                <a:latin typeface="Times New Roman" panose="02020603050405020304" pitchFamily="18" charset="0"/>
+                <a:cs typeface="Times New Roman" panose="02020603050405020304" pitchFamily="18" charset="0"/>
+              </a:rPr>
+              <a:t>Uncontrollable</a:t>
+            </a:r>
+          </a:p>
+          <a:p>
+            <a:pPr algn="ctr"/>
+            <a:r>
+              <a:rPr lang="en-US" sz="1200" dirty="0">
+                <a:latin typeface="Times New Roman" panose="02020603050405020304" pitchFamily="18" charset="0"/>
+                <a:cs typeface="Times New Roman" panose="02020603050405020304" pitchFamily="18" charset="0"/>
+              </a:rPr>
+              <a:t>Region</a:t>
+            </a:r>
+          </a:p>
+        </p:txBody>
+      </p:sp>
+      <p:cxnSp>
+        <p:nvCxnSpPr>
+          <p:cNvPr id="21" name="Straight Arrow Connector 20">
+            <a:extLst>
+              <a:ext uri="{FF2B5EF4-FFF2-40B4-BE49-F238E27FC236}">
+                <a16:creationId xmlns:a16="http://schemas.microsoft.com/office/drawing/2014/main" id="{AE6817F8-0EB0-4D46-96D8-CD8B3621C529}"/>
+              </a:ext>
+            </a:extLst>
+          </p:cNvPr>
+          <p:cNvCxnSpPr>
+            <a:cxnSpLocks/>
+          </p:cNvCxnSpPr>
+          <p:nvPr/>
+        </p:nvCxnSpPr>
+        <p:spPr>
+          <a:xfrm>
+            <a:off x="5912141" y="2796536"/>
+            <a:ext cx="858046" cy="0"/>
+          </a:xfrm>
+          <a:prstGeom prst="straightConnector1">
+            <a:avLst/>
+          </a:prstGeom>
+          <a:ln w="28575">
+            <a:solidFill>
+              <a:srgbClr val="AA12AE"/>
+            </a:solidFill>
+            <a:tailEnd type="triangle"/>
+          </a:ln>
+          <a:effectLst>
+            <a:glow rad="25400">
+              <a:schemeClr val="bg1"/>
+            </a:glow>
+          </a:effectLst>
+        </p:spPr>
+        <p:style>
+          <a:lnRef idx="1">
+            <a:schemeClr val="accent1"/>
+          </a:lnRef>
+          <a:fillRef idx="0">
+            <a:schemeClr val="accent1"/>
+          </a:fillRef>
+          <a:effectRef idx="0">
+            <a:schemeClr val="accent1"/>
+          </a:effectRef>
+          <a:fontRef idx="minor">
+            <a:schemeClr val="tx1"/>
+          </a:fontRef>
+        </p:style>
+      </p:cxnSp>
+      <p:sp>
+        <p:nvSpPr>
+          <p:cNvPr id="30" name="TextBox 29">
+            <a:extLst>
+              <a:ext uri="{FF2B5EF4-FFF2-40B4-BE49-F238E27FC236}">
+                <a16:creationId xmlns:a16="http://schemas.microsoft.com/office/drawing/2014/main" id="{DB2B4A83-1876-4C19-8CBD-AE1CFFBF05E7}"/>
+              </a:ext>
+            </a:extLst>
+          </p:cNvPr>
+          <p:cNvSpPr txBox="1"/>
+          <p:nvPr/>
+        </p:nvSpPr>
+        <p:spPr>
+          <a:xfrm>
+            <a:off x="3380511" y="2187661"/>
+            <a:ext cx="1034470" cy="461665"/>
+          </a:xfrm>
+          <a:prstGeom prst="rect">
+            <a:avLst/>
+          </a:prstGeom>
+          <a:solidFill>
+            <a:schemeClr val="bg1">
+              <a:alpha val="95000"/>
+            </a:schemeClr>
+          </a:solidFill>
+        </p:spPr>
+        <p:txBody>
+          <a:bodyPr wrap="square" rtlCol="0">
+            <a:spAutoFit/>
+          </a:bodyPr>
+          <a:lstStyle/>
+          <a:p>
+            <a:pPr algn="ctr"/>
+            <a:r>
+              <a:rPr lang="en-US" sz="1200" dirty="0">
+                <a:latin typeface="Times New Roman" panose="02020603050405020304" pitchFamily="18" charset="0"/>
+                <a:cs typeface="Times New Roman" panose="02020603050405020304" pitchFamily="18" charset="0"/>
+              </a:rPr>
+              <a:t>Controllable</a:t>
+            </a:r>
+          </a:p>
+          <a:p>
+            <a:pPr algn="ctr"/>
+            <a:r>
+              <a:rPr lang="en-US" sz="1200" dirty="0">
+                <a:latin typeface="Times New Roman" panose="02020603050405020304" pitchFamily="18" charset="0"/>
+                <a:cs typeface="Times New Roman" panose="02020603050405020304" pitchFamily="18" charset="0"/>
+              </a:rPr>
+              <a:t>Region</a:t>
+            </a:r>
+          </a:p>
+        </p:txBody>
+      </p:sp>
+      <p:cxnSp>
+        <p:nvCxnSpPr>
+          <p:cNvPr id="32" name="Straight Arrow Connector 31">
+            <a:extLst>
+              <a:ext uri="{FF2B5EF4-FFF2-40B4-BE49-F238E27FC236}">
+                <a16:creationId xmlns:a16="http://schemas.microsoft.com/office/drawing/2014/main" id="{4CE86F40-7803-41A9-AED5-8AB0F27F15B7}"/>
+              </a:ext>
+            </a:extLst>
+          </p:cNvPr>
+          <p:cNvCxnSpPr>
+            <a:cxnSpLocks/>
+            <a:stCxn id="30" idx="2"/>
+          </p:cNvCxnSpPr>
+          <p:nvPr/>
+        </p:nvCxnSpPr>
+        <p:spPr>
+          <a:xfrm>
+            <a:off x="3897746" y="2649326"/>
+            <a:ext cx="9067" cy="378043"/>
+          </a:xfrm>
+          <a:prstGeom prst="straightConnector1">
+            <a:avLst/>
+          </a:prstGeom>
+          <a:ln w="28575">
+            <a:solidFill>
+              <a:srgbClr val="48BAC0"/>
+            </a:solidFill>
+            <a:tailEnd type="triangle"/>
+          </a:ln>
+          <a:effectLst>
+            <a:glow rad="25400">
+              <a:schemeClr val="bg1"/>
+            </a:glow>
+          </a:effectLst>
+        </p:spPr>
+        <p:style>
+          <a:lnRef idx="1">
+            <a:schemeClr val="accent1"/>
+          </a:lnRef>
+          <a:fillRef idx="0">
+            <a:schemeClr val="accent1"/>
+          </a:fillRef>
+          <a:effectRef idx="0">
+            <a:schemeClr val="accent1"/>
+          </a:effectRef>
+          <a:fontRef idx="minor">
+            <a:schemeClr val="tx1"/>
+          </a:fontRef>
+        </p:style>
+      </p:cxnSp>
+      <mc:AlternateContent xmlns:mc="http://schemas.openxmlformats.org/markup-compatibility/2006" xmlns:a14="http://schemas.microsoft.com/office/drawing/2010/main">
+        <mc:Choice Requires="a14">
+          <p:sp>
+            <p:nvSpPr>
+              <p:cNvPr id="41" name="TextBox 40">
+                <a:extLst>
+                  <a:ext uri="{FF2B5EF4-FFF2-40B4-BE49-F238E27FC236}">
+                    <a16:creationId xmlns:a16="http://schemas.microsoft.com/office/drawing/2014/main" id="{9163B07D-57BC-4D62-A462-5F0922A115B3}"/>
+                  </a:ext>
+                </a:extLst>
+              </p:cNvPr>
+              <p:cNvSpPr txBox="1"/>
+              <p:nvPr/>
+            </p:nvSpPr>
+            <p:spPr>
+              <a:xfrm>
+                <a:off x="4182221" y="4219356"/>
+                <a:ext cx="3086047" cy="369332"/>
+              </a:xfrm>
+              <a:prstGeom prst="rect">
+                <a:avLst/>
+              </a:prstGeom>
+              <a:noFill/>
+            </p:spPr>
+            <p:txBody>
+              <a:bodyPr wrap="square" rtlCol="0">
+                <a:spAutoFit/>
+              </a:bodyPr>
+              <a:lstStyle/>
+              <a:p>
+                <a:r>
+                  <a:rPr lang="en-US" dirty="0">
+                    <a:latin typeface="Times New Roman" panose="02020603050405020304" pitchFamily="18" charset="0"/>
+                    <a:cs typeface="Times New Roman" panose="02020603050405020304" pitchFamily="18" charset="0"/>
+                  </a:rPr>
+                  <a:t> </a:t>
+                </a:r>
+                <a:r>
+                  <a:rPr lang="en-US" sz="1600" dirty="0">
+                    <a:latin typeface="Times New Roman" panose="02020603050405020304" pitchFamily="18" charset="0"/>
+                    <a:cs typeface="Times New Roman" panose="02020603050405020304" pitchFamily="18" charset="0"/>
+                  </a:rPr>
+                  <a:t>Modulation index (</a:t>
+                </a:r>
+                <a14:m>
+                  <m:oMath xmlns:m="http://schemas.openxmlformats.org/officeDocument/2006/math">
+                    <m:sSub>
+                      <m:sSubPr>
+                        <m:ctrlPr>
+                          <a:rPr lang="en-US" sz="1600" i="1" dirty="0" smtClean="0">
+                            <a:latin typeface="Cambria Math" panose="02040503050406030204" pitchFamily="18" charset="0"/>
+                            <a:cs typeface="Times New Roman" panose="02020603050405020304" pitchFamily="18" charset="0"/>
+                          </a:rPr>
+                        </m:ctrlPr>
+                      </m:sSubPr>
+                      <m:e>
+                        <m:r>
+                          <a:rPr lang="en-US" sz="1600" i="1" dirty="0" smtClean="0">
+                            <a:latin typeface="Cambria Math" panose="02040503050406030204" pitchFamily="18" charset="0"/>
+                            <a:cs typeface="Times New Roman" panose="02020603050405020304" pitchFamily="18" charset="0"/>
+                          </a:rPr>
+                          <m:t>𝑚</m:t>
+                        </m:r>
+                      </m:e>
+                      <m:sub>
+                        <m:r>
+                          <a:rPr lang="en-US" sz="1600" i="1" dirty="0" smtClean="0">
+                            <a:latin typeface="Cambria Math" panose="02040503050406030204" pitchFamily="18" charset="0"/>
+                            <a:cs typeface="Times New Roman" panose="02020603050405020304" pitchFamily="18" charset="0"/>
+                          </a:rPr>
+                          <m:t>𝑎</m:t>
+                        </m:r>
+                      </m:sub>
+                    </m:sSub>
+                  </m:oMath>
+                </a14:m>
+                <a:r>
+                  <a:rPr lang="en-US" sz="1600" dirty="0">
+                    <a:latin typeface="Times New Roman" panose="02020603050405020304" pitchFamily="18" charset="0"/>
+                    <a:cs typeface="Times New Roman" panose="02020603050405020304" pitchFamily="18" charset="0"/>
+                  </a:rPr>
+                  <a:t>)</a:t>
+                </a:r>
+              </a:p>
+            </p:txBody>
+          </p:sp>
+        </mc:Choice>
+        <mc:Fallback xmlns="">
+          <p:sp>
+            <p:nvSpPr>
+              <p:cNvPr id="41" name="TextBox 40">
+                <a:extLst>
+                  <a:ext uri="{FF2B5EF4-FFF2-40B4-BE49-F238E27FC236}">
+                    <a16:creationId xmlns:a16="http://schemas.microsoft.com/office/drawing/2014/main" id="{9163B07D-57BC-4D62-A462-5F0922A115B3}"/>
+                  </a:ext>
+                </a:extLst>
+              </p:cNvPr>
+              <p:cNvSpPr txBox="1">
+                <a:spLocks noRot="1" noChangeAspect="1" noMove="1" noResize="1" noEditPoints="1" noAdjustHandles="1" noChangeArrowheads="1" noChangeShapeType="1" noTextEdit="1"/>
+              </p:cNvSpPr>
+              <p:nvPr/>
+            </p:nvSpPr>
+            <p:spPr>
+              <a:xfrm>
+                <a:off x="4182221" y="4219356"/>
+                <a:ext cx="3086047" cy="369332"/>
+              </a:xfrm>
+              <a:prstGeom prst="rect">
+                <a:avLst/>
+              </a:prstGeom>
+              <a:blipFill>
+                <a:blip r:embed="rId5"/>
+                <a:stretch>
+                  <a:fillRect b="-18033"/>
+                </a:stretch>
+              </a:blipFill>
+            </p:spPr>
+            <p:txBody>
+              <a:bodyPr/>
+              <a:lstStyle/>
+              <a:p>
+                <a:r>
+                  <a:rPr lang="en-US">
+                    <a:noFill/>
+                  </a:rPr>
+                  <a:t> </a:t>
+                </a:r>
+              </a:p>
+            </p:txBody>
+          </p:sp>
+        </mc:Fallback>
+      </mc:AlternateContent>
+      <p:cxnSp>
+        <p:nvCxnSpPr>
+          <p:cNvPr id="38" name="Straight Connector 37">
+            <a:extLst>
+              <a:ext uri="{FF2B5EF4-FFF2-40B4-BE49-F238E27FC236}">
+                <a16:creationId xmlns:a16="http://schemas.microsoft.com/office/drawing/2014/main" id="{E5759970-97E1-41B6-9707-0129FBD186BF}"/>
+              </a:ext>
+            </a:extLst>
+          </p:cNvPr>
+          <p:cNvCxnSpPr>
+            <a:cxnSpLocks/>
+          </p:cNvCxnSpPr>
+          <p:nvPr/>
+        </p:nvCxnSpPr>
+        <p:spPr>
+          <a:xfrm>
+            <a:off x="6965381" y="1662545"/>
+            <a:ext cx="0" cy="2821557"/>
+          </a:xfrm>
+          <a:prstGeom prst="line">
+            <a:avLst/>
+          </a:prstGeom>
+          <a:effectLst>
+            <a:glow rad="38100">
+              <a:schemeClr val="bg1"/>
+            </a:glow>
+          </a:effectLst>
+        </p:spPr>
+        <p:style>
+          <a:lnRef idx="1">
+            <a:schemeClr val="accent1"/>
+          </a:lnRef>
+          <a:fillRef idx="0">
+            <a:schemeClr val="accent1"/>
+          </a:fillRef>
+          <a:effectRef idx="0">
+            <a:schemeClr val="accent1"/>
+          </a:effectRef>
+          <a:fontRef idx="minor">
+            <a:schemeClr val="tx1"/>
+          </a:fontRef>
+        </p:style>
+      </p:cxnSp>
+      <p:cxnSp>
+        <p:nvCxnSpPr>
+          <p:cNvPr id="52" name="Straight Arrow Connector 51">
+            <a:extLst>
+              <a:ext uri="{FF2B5EF4-FFF2-40B4-BE49-F238E27FC236}">
+                <a16:creationId xmlns:a16="http://schemas.microsoft.com/office/drawing/2014/main" id="{334FBFC1-56F8-4F70-8CFE-BAE57450CA2F}"/>
+              </a:ext>
+            </a:extLst>
+          </p:cNvPr>
+          <p:cNvCxnSpPr>
+            <a:cxnSpLocks/>
+          </p:cNvCxnSpPr>
+          <p:nvPr/>
+        </p:nvCxnSpPr>
+        <p:spPr>
+          <a:xfrm>
+            <a:off x="6965381" y="4484102"/>
+            <a:ext cx="131031" cy="0"/>
+          </a:xfrm>
+          <a:prstGeom prst="straightConnector1">
+            <a:avLst/>
+          </a:prstGeom>
+          <a:ln>
+            <a:tailEnd type="triangle"/>
+          </a:ln>
+        </p:spPr>
+        <p:style>
+          <a:lnRef idx="1">
+            <a:schemeClr val="accent1"/>
+          </a:lnRef>
+          <a:fillRef idx="0">
+            <a:schemeClr val="accent1"/>
+          </a:fillRef>
+          <a:effectRef idx="0">
+            <a:schemeClr val="accent1"/>
+          </a:effectRef>
+          <a:fontRef idx="minor">
+            <a:schemeClr val="tx1"/>
+          </a:fontRef>
+        </p:style>
+      </p:cxnSp>
+      <p:cxnSp>
+        <p:nvCxnSpPr>
+          <p:cNvPr id="58" name="Straight Connector 57">
+            <a:extLst>
+              <a:ext uri="{FF2B5EF4-FFF2-40B4-BE49-F238E27FC236}">
+                <a16:creationId xmlns:a16="http://schemas.microsoft.com/office/drawing/2014/main" id="{87CF85A7-9ECC-4E19-B92D-A6981B398980}"/>
+              </a:ext>
+            </a:extLst>
+          </p:cNvPr>
+          <p:cNvCxnSpPr>
+            <a:cxnSpLocks/>
+          </p:cNvCxnSpPr>
+          <p:nvPr/>
+        </p:nvCxnSpPr>
+        <p:spPr>
+          <a:xfrm flipH="1">
+            <a:off x="3040381" y="3163074"/>
+            <a:ext cx="4691600" cy="0"/>
+          </a:xfrm>
+          <a:prstGeom prst="line">
+            <a:avLst/>
+          </a:prstGeom>
+          <a:effectLst>
+            <a:glow rad="38100">
+              <a:schemeClr val="bg1"/>
+            </a:glow>
+          </a:effectLst>
+        </p:spPr>
+        <p:style>
+          <a:lnRef idx="1">
+            <a:schemeClr val="accent1"/>
+          </a:lnRef>
+          <a:fillRef idx="0">
+            <a:schemeClr val="accent1"/>
+          </a:fillRef>
+          <a:effectRef idx="0">
+            <a:schemeClr val="accent1"/>
+          </a:effectRef>
+          <a:fontRef idx="minor">
+            <a:schemeClr val="tx1"/>
+          </a:fontRef>
+        </p:style>
+      </p:cxnSp>
+      <p:cxnSp>
+        <p:nvCxnSpPr>
+          <p:cNvPr id="64" name="Straight Arrow Connector 63">
+            <a:extLst>
+              <a:ext uri="{FF2B5EF4-FFF2-40B4-BE49-F238E27FC236}">
+                <a16:creationId xmlns:a16="http://schemas.microsoft.com/office/drawing/2014/main" id="{9E51F72B-EB20-482E-853D-CD38D2B5DF54}"/>
+              </a:ext>
+            </a:extLst>
+          </p:cNvPr>
+          <p:cNvCxnSpPr>
+            <a:cxnSpLocks/>
+          </p:cNvCxnSpPr>
+          <p:nvPr/>
+        </p:nvCxnSpPr>
+        <p:spPr>
+          <a:xfrm>
+            <a:off x="7731981" y="3164629"/>
+            <a:ext cx="0" cy="165311"/>
+          </a:xfrm>
+          <a:prstGeom prst="straightConnector1">
+            <a:avLst/>
+          </a:prstGeom>
+          <a:ln>
+            <a:tailEnd type="triangle"/>
+          </a:ln>
+        </p:spPr>
+        <p:style>
+          <a:lnRef idx="1">
+            <a:schemeClr val="accent1"/>
+          </a:lnRef>
+          <a:fillRef idx="0">
+            <a:schemeClr val="accent1"/>
+          </a:fillRef>
+          <a:effectRef idx="0">
+            <a:schemeClr val="accent1"/>
+          </a:effectRef>
+          <a:fontRef idx="minor">
+            <a:schemeClr val="tx1"/>
+          </a:fontRef>
+        </p:style>
+      </p:cxnSp>
+      <mc:AlternateContent xmlns:mc="http://schemas.openxmlformats.org/markup-compatibility/2006" xmlns:a14="http://schemas.microsoft.com/office/drawing/2010/main">
+        <mc:Choice Requires="a14">
+          <p:sp>
+            <p:nvSpPr>
+              <p:cNvPr id="69" name="TextBox 68">
+                <a:extLst>
+                  <a:ext uri="{FF2B5EF4-FFF2-40B4-BE49-F238E27FC236}">
+                    <a16:creationId xmlns:a16="http://schemas.microsoft.com/office/drawing/2014/main" id="{50F2277D-364E-490F-B190-8955DBDAE599}"/>
+                  </a:ext>
+                </a:extLst>
+              </p:cNvPr>
+              <p:cNvSpPr txBox="1"/>
+              <p:nvPr/>
+            </p:nvSpPr>
+            <p:spPr>
+              <a:xfrm>
+                <a:off x="7487061" y="3269645"/>
+                <a:ext cx="589360" cy="307777"/>
+              </a:xfrm>
+              <a:prstGeom prst="rect">
+                <a:avLst/>
+              </a:prstGeom>
+              <a:noFill/>
+            </p:spPr>
+            <p:txBody>
+              <a:bodyPr wrap="square" rtlCol="0">
+                <a:spAutoFit/>
+              </a:bodyPr>
+              <a:lstStyle/>
+              <a:p>
+                <a:pPr/>
+                <a14:m>
+                  <m:oMathPara xmlns:m="http://schemas.openxmlformats.org/officeDocument/2006/math">
+                    <m:oMathParaPr>
+                      <m:jc m:val="centerGroup"/>
+                    </m:oMathParaPr>
+                    <m:oMath xmlns:m="http://schemas.openxmlformats.org/officeDocument/2006/math">
+                      <m:r>
+                        <a:rPr lang="en-US" sz="1400" b="0" i="1" dirty="0" smtClean="0">
+                          <a:latin typeface="Cambria Math" panose="02040503050406030204" pitchFamily="18" charset="0"/>
+                          <a:cs typeface="Times New Roman" panose="02020603050405020304" pitchFamily="18" charset="0"/>
+                        </a:rPr>
+                        <m:t>0.44</m:t>
+                      </m:r>
+                    </m:oMath>
+                  </m:oMathPara>
+                </a14:m>
+                <a:endParaRPr lang="en-US" sz="1600" dirty="0">
+                  <a:latin typeface="Times New Roman" panose="02020603050405020304" pitchFamily="18" charset="0"/>
+                  <a:cs typeface="Times New Roman" panose="02020603050405020304" pitchFamily="18" charset="0"/>
+                </a:endParaRPr>
+              </a:p>
+            </p:txBody>
+          </p:sp>
+        </mc:Choice>
+        <mc:Fallback xmlns="">
+          <p:sp>
+            <p:nvSpPr>
+              <p:cNvPr id="69" name="TextBox 68">
+                <a:extLst>
+                  <a:ext uri="{FF2B5EF4-FFF2-40B4-BE49-F238E27FC236}">
+                    <a16:creationId xmlns:a16="http://schemas.microsoft.com/office/drawing/2014/main" id="{50F2277D-364E-490F-B190-8955DBDAE599}"/>
+                  </a:ext>
+                </a:extLst>
+              </p:cNvPr>
+              <p:cNvSpPr txBox="1">
+                <a:spLocks noRot="1" noChangeAspect="1" noMove="1" noResize="1" noEditPoints="1" noAdjustHandles="1" noChangeArrowheads="1" noChangeShapeType="1" noTextEdit="1"/>
+              </p:cNvSpPr>
+              <p:nvPr/>
+            </p:nvSpPr>
+            <p:spPr>
+              <a:xfrm>
+                <a:off x="7487061" y="3269645"/>
+                <a:ext cx="589360" cy="307777"/>
+              </a:xfrm>
+              <a:prstGeom prst="rect">
+                <a:avLst/>
+              </a:prstGeom>
+              <a:blipFill>
+                <a:blip r:embed="rId6"/>
+                <a:stretch>
+                  <a:fillRect/>
+                </a:stretch>
+              </a:blipFill>
+            </p:spPr>
+            <p:txBody>
+              <a:bodyPr/>
+              <a:lstStyle/>
+              <a:p>
+                <a:r>
+                  <a:rPr lang="en-US">
+                    <a:noFill/>
+                  </a:rPr>
+                  <a:t> </a:t>
+                </a:r>
+              </a:p>
+            </p:txBody>
+          </p:sp>
+        </mc:Fallback>
+      </mc:AlternateContent>
+    </p:spTree>
+    <p:extLst>
+      <p:ext uri="{BB962C8B-B14F-4D97-AF65-F5344CB8AC3E}">
+        <p14:creationId xmlns:p14="http://schemas.microsoft.com/office/powerpoint/2010/main" val="1667792741"/>
       </p:ext>
     </p:extLst>
   </p:cSld>

</xml_diff>